<commit_message>
added "author" to config file, added RAPID template and config file, set as dafault instead of YETI,
some other fixes:
    - evePresentation.py: better parsing
    - evePresentation.py:variant parameters as NamedTuple
    - evePresentation.py:added author
    - cli.py: updated descriptions and defaults
</commit_message>
<xml_diff>
--- a/TEMPLATES/SABLONA-RAPID-AEROAKUSTIKA.pptx
+++ b/TEMPLATES/SABLONA-RAPID-AEROAKUSTIKA.pptx
@@ -206,7 +206,7 @@
           <a:p>
             <a:fld id="{4165122A-6637-43F4-B00C-C848E0F852C8}" type="datetimeFigureOut">
               <a:rPr lang="cs-CZ" smtClean="0"/>
-              <a:t>30.03.2017</a:t>
+              <a:t>03.04.2017</a:t>
             </a:fld>
             <a:endParaRPr lang="cs-CZ"/>
           </a:p>
@@ -638,7 +638,10 @@
           <a:bodyPr/>
           <a:lstStyle>
             <a:lvl1pPr algn="ctr">
-              <a:defRPr/>
+              <a:defRPr b="1">
+                <a:latin typeface="Arial" panose="020B0604020202020204" pitchFamily="34" charset="0"/>
+                <a:cs typeface="Arial" panose="020B0604020202020204" pitchFamily="34" charset="0"/>
+              </a:defRPr>
             </a:lvl1pPr>
           </a:lstStyle>
           <a:p>
@@ -662,15 +665,18 @@
         </p:nvSpPr>
         <p:spPr>
           <a:xfrm>
-            <a:off x="128588" y="1988840"/>
-            <a:ext cx="863972" cy="3960440"/>
+            <a:off x="416496" y="1988840"/>
+            <a:ext cx="720000" cy="3240000"/>
           </a:xfrm>
         </p:spPr>
         <p:txBody>
           <a:bodyPr/>
           <a:lstStyle>
             <a:lvl1pPr>
-              <a:defRPr/>
+              <a:defRPr>
+                <a:latin typeface="Arial" panose="020B0604020202020204" pitchFamily="34" charset="0"/>
+                <a:cs typeface="Arial" panose="020B0604020202020204" pitchFamily="34" charset="0"/>
+              </a:defRPr>
             </a:lvl1pPr>
           </a:lstStyle>
           <a:p>
@@ -695,14 +701,17 @@
         <p:spPr>
           <a:xfrm>
             <a:off x="1496616" y="1988840"/>
-            <a:ext cx="2880320" cy="2016224"/>
+            <a:ext cx="2700000" cy="1980000"/>
           </a:xfrm>
         </p:spPr>
         <p:txBody>
           <a:bodyPr/>
           <a:lstStyle>
             <a:lvl1pPr>
-              <a:defRPr/>
+              <a:defRPr>
+                <a:latin typeface="Arial" panose="020B0604020202020204" pitchFamily="34" charset="0"/>
+                <a:cs typeface="Arial" panose="020B0604020202020204" pitchFamily="34" charset="0"/>
+              </a:defRPr>
             </a:lvl1pPr>
           </a:lstStyle>
           <a:p>
@@ -727,14 +736,17 @@
         <p:spPr>
           <a:xfrm>
             <a:off x="5529064" y="1988840"/>
-            <a:ext cx="2880320" cy="2016224"/>
+            <a:ext cx="2700000" cy="1980000"/>
           </a:xfrm>
         </p:spPr>
         <p:txBody>
           <a:bodyPr/>
           <a:lstStyle>
             <a:lvl1pPr>
-              <a:defRPr/>
+              <a:defRPr>
+                <a:latin typeface="Arial" panose="020B0604020202020204" pitchFamily="34" charset="0"/>
+                <a:cs typeface="Arial" panose="020B0604020202020204" pitchFamily="34" charset="0"/>
+              </a:defRPr>
             </a:lvl1pPr>
           </a:lstStyle>
           <a:p>
@@ -759,14 +771,17 @@
         <p:spPr>
           <a:xfrm>
             <a:off x="3584848" y="4149080"/>
-            <a:ext cx="2880320" cy="2016224"/>
+            <a:ext cx="2700000" cy="1980000"/>
           </a:xfrm>
         </p:spPr>
         <p:txBody>
           <a:bodyPr/>
           <a:lstStyle>
             <a:lvl1pPr>
-              <a:defRPr/>
+              <a:defRPr>
+                <a:latin typeface="Arial" panose="020B0604020202020204" pitchFamily="34" charset="0"/>
+                <a:cs typeface="Arial" panose="020B0604020202020204" pitchFamily="34" charset="0"/>
+              </a:defRPr>
             </a:lvl1pPr>
           </a:lstStyle>
           <a:p>
@@ -790,7 +805,7 @@
         </p:nvSpPr>
         <p:spPr>
           <a:xfrm>
-            <a:off x="2216696" y="1484784"/>
+            <a:off x="2648744" y="1484784"/>
             <a:ext cx="1296988" cy="360362"/>
           </a:xfrm>
         </p:spPr>
@@ -798,7 +813,10 @@
           <a:bodyPr/>
           <a:lstStyle>
             <a:lvl1pPr>
-              <a:defRPr baseline="0"/>
+              <a:defRPr b="1" baseline="0">
+                <a:latin typeface="Arial" panose="020B0604020202020204" pitchFamily="34" charset="0"/>
+                <a:cs typeface="Arial" panose="020B0604020202020204" pitchFamily="34" charset="0"/>
+              </a:defRPr>
             </a:lvl1pPr>
           </a:lstStyle>
           <a:p>
@@ -823,7 +841,7 @@
         </p:nvSpPr>
         <p:spPr>
           <a:xfrm>
-            <a:off x="6321152" y="1484784"/>
+            <a:off x="6609184" y="1484784"/>
             <a:ext cx="1296988" cy="360362"/>
           </a:xfrm>
         </p:spPr>
@@ -831,7 +849,10 @@
           <a:bodyPr/>
           <a:lstStyle>
             <a:lvl1pPr>
-              <a:defRPr baseline="0"/>
+              <a:defRPr b="1" baseline="0">
+                <a:latin typeface="Arial" panose="020B0604020202020204" pitchFamily="34" charset="0"/>
+                <a:cs typeface="Arial" panose="020B0604020202020204" pitchFamily="34" charset="0"/>
+              </a:defRPr>
             </a:lvl1pPr>
           </a:lstStyle>
           <a:p>
@@ -864,7 +885,10 @@
           <a:bodyPr/>
           <a:lstStyle>
             <a:lvl1pPr>
-              <a:defRPr baseline="0"/>
+              <a:defRPr b="1" baseline="0">
+                <a:latin typeface="Arial" panose="020B0604020202020204" pitchFamily="34" charset="0"/>
+                <a:cs typeface="Arial" panose="020B0604020202020204" pitchFamily="34" charset="0"/>
+              </a:defRPr>
             </a:lvl1pPr>
           </a:lstStyle>
           <a:p>
@@ -960,7 +984,10 @@
           <a:bodyPr/>
           <a:lstStyle>
             <a:lvl1pPr algn="ctr">
-              <a:defRPr/>
+              <a:defRPr sz="1800" b="1">
+                <a:latin typeface="Arial" panose="020B0604020202020204" pitchFamily="34" charset="0"/>
+                <a:cs typeface="Arial" panose="020B0604020202020204" pitchFamily="34" charset="0"/>
+              </a:defRPr>
             </a:lvl1pPr>
           </a:lstStyle>
           <a:p>
@@ -988,15 +1015,18 @@
         </p:nvSpPr>
         <p:spPr>
           <a:xfrm>
-            <a:off x="128588" y="1988840"/>
-            <a:ext cx="863972" cy="3960440"/>
+            <a:off x="344488" y="2420888"/>
+            <a:ext cx="720000" cy="3240000"/>
           </a:xfrm>
         </p:spPr>
         <p:txBody>
           <a:bodyPr/>
           <a:lstStyle>
             <a:lvl1pPr>
-              <a:defRPr/>
+              <a:defRPr sz="1800">
+                <a:latin typeface="Arial" panose="020B0604020202020204" pitchFamily="34" charset="0"/>
+                <a:cs typeface="Arial" panose="020B0604020202020204" pitchFamily="34" charset="0"/>
+              </a:defRPr>
             </a:lvl1pPr>
           </a:lstStyle>
           <a:p>
@@ -1020,15 +1050,18 @@
         </p:nvSpPr>
         <p:spPr>
           <a:xfrm>
-            <a:off x="1280592" y="1988840"/>
-            <a:ext cx="2663825" cy="1800225"/>
+            <a:off x="1280591" y="1988840"/>
+            <a:ext cx="2700000" cy="1980000"/>
           </a:xfrm>
         </p:spPr>
         <p:txBody>
           <a:bodyPr/>
           <a:lstStyle>
             <a:lvl1pPr>
-              <a:defRPr/>
+              <a:defRPr sz="1800">
+                <a:latin typeface="Arial" panose="020B0604020202020204" pitchFamily="34" charset="0"/>
+                <a:cs typeface="Arial" panose="020B0604020202020204" pitchFamily="34" charset="0"/>
+              </a:defRPr>
             </a:lvl1pPr>
           </a:lstStyle>
           <a:p>
@@ -1052,15 +1085,18 @@
         </p:nvSpPr>
         <p:spPr>
           <a:xfrm>
-            <a:off x="4088904" y="1988840"/>
-            <a:ext cx="2663825" cy="1800225"/>
+            <a:off x="4088903" y="1988839"/>
+            <a:ext cx="2700000" cy="1980000"/>
           </a:xfrm>
         </p:spPr>
         <p:txBody>
           <a:bodyPr/>
           <a:lstStyle>
             <a:lvl1pPr>
-              <a:defRPr/>
+              <a:defRPr sz="1800">
+                <a:latin typeface="Arial" panose="020B0604020202020204" pitchFamily="34" charset="0"/>
+                <a:cs typeface="Arial" panose="020B0604020202020204" pitchFamily="34" charset="0"/>
+              </a:defRPr>
             </a:lvl1pPr>
           </a:lstStyle>
           <a:p>
@@ -1084,15 +1120,18 @@
         </p:nvSpPr>
         <p:spPr>
           <a:xfrm>
-            <a:off x="6897216" y="1988840"/>
-            <a:ext cx="2663825" cy="1800225"/>
+            <a:off x="6897215" y="1988839"/>
+            <a:ext cx="2700000" cy="1980000"/>
           </a:xfrm>
         </p:spPr>
         <p:txBody>
           <a:bodyPr/>
           <a:lstStyle>
             <a:lvl1pPr>
-              <a:defRPr/>
+              <a:defRPr sz="1800">
+                <a:latin typeface="Arial" panose="020B0604020202020204" pitchFamily="34" charset="0"/>
+                <a:cs typeface="Arial" panose="020B0604020202020204" pitchFamily="34" charset="0"/>
+              </a:defRPr>
             </a:lvl1pPr>
           </a:lstStyle>
           <a:p>
@@ -1116,15 +1155,18 @@
         </p:nvSpPr>
         <p:spPr>
           <a:xfrm>
-            <a:off x="1280592" y="4149080"/>
-            <a:ext cx="2663825" cy="1800225"/>
+            <a:off x="1280591" y="4149079"/>
+            <a:ext cx="2700000" cy="1980000"/>
           </a:xfrm>
         </p:spPr>
         <p:txBody>
           <a:bodyPr/>
           <a:lstStyle>
             <a:lvl1pPr>
-              <a:defRPr baseline="0"/>
+              <a:defRPr sz="1800" baseline="0">
+                <a:latin typeface="Arial" panose="020B0604020202020204" pitchFamily="34" charset="0"/>
+                <a:cs typeface="Arial" panose="020B0604020202020204" pitchFamily="34" charset="0"/>
+              </a:defRPr>
             </a:lvl1pPr>
           </a:lstStyle>
           <a:p>
@@ -1148,15 +1190,18 @@
         </p:nvSpPr>
         <p:spPr>
           <a:xfrm>
-            <a:off x="4088904" y="4149080"/>
-            <a:ext cx="2663825" cy="1800225"/>
+            <a:off x="4088903" y="4149079"/>
+            <a:ext cx="2700000" cy="1980000"/>
           </a:xfrm>
         </p:spPr>
         <p:txBody>
           <a:bodyPr/>
           <a:lstStyle>
             <a:lvl1pPr>
-              <a:defRPr/>
+              <a:defRPr sz="1800">
+                <a:latin typeface="Arial" panose="020B0604020202020204" pitchFamily="34" charset="0"/>
+                <a:cs typeface="Arial" panose="020B0604020202020204" pitchFamily="34" charset="0"/>
+              </a:defRPr>
             </a:lvl1pPr>
           </a:lstStyle>
           <a:p>
@@ -1180,15 +1225,18 @@
         </p:nvSpPr>
         <p:spPr>
           <a:xfrm>
-            <a:off x="6897216" y="4149080"/>
-            <a:ext cx="2663825" cy="1800225"/>
+            <a:off x="6897215" y="4149079"/>
+            <a:ext cx="2700000" cy="1980000"/>
           </a:xfrm>
         </p:spPr>
         <p:txBody>
           <a:bodyPr/>
           <a:lstStyle>
             <a:lvl1pPr>
-              <a:defRPr/>
+              <a:defRPr sz="1800">
+                <a:latin typeface="Arial" panose="020B0604020202020204" pitchFamily="34" charset="0"/>
+                <a:cs typeface="Arial" panose="020B0604020202020204" pitchFamily="34" charset="0"/>
+              </a:defRPr>
             </a:lvl1pPr>
           </a:lstStyle>
           <a:p>
@@ -1212,7 +1260,7 @@
         </p:nvSpPr>
         <p:spPr>
           <a:xfrm>
-            <a:off x="2000672" y="1484784"/>
+            <a:off x="2359868" y="1484784"/>
             <a:ext cx="1296988" cy="360362"/>
           </a:xfrm>
         </p:spPr>
@@ -1220,7 +1268,10 @@
           <a:bodyPr/>
           <a:lstStyle>
             <a:lvl1pPr>
-              <a:defRPr/>
+              <a:defRPr sz="1800" b="1">
+                <a:latin typeface="Arial" panose="020B0604020202020204" pitchFamily="34" charset="0"/>
+                <a:cs typeface="Arial" panose="020B0604020202020204" pitchFamily="34" charset="0"/>
+              </a:defRPr>
             </a:lvl1pPr>
           </a:lstStyle>
           <a:p>
@@ -1245,7 +1296,7 @@
         </p:nvSpPr>
         <p:spPr>
           <a:xfrm>
-            <a:off x="4736976" y="1484784"/>
+            <a:off x="5096172" y="1484784"/>
             <a:ext cx="1296988" cy="360362"/>
           </a:xfrm>
         </p:spPr>
@@ -1253,7 +1304,10 @@
           <a:bodyPr/>
           <a:lstStyle>
             <a:lvl1pPr>
-              <a:defRPr/>
+              <a:defRPr sz="1800" b="1">
+                <a:latin typeface="Arial" panose="020B0604020202020204" pitchFamily="34" charset="0"/>
+                <a:cs typeface="Arial" panose="020B0604020202020204" pitchFamily="34" charset="0"/>
+              </a:defRPr>
             </a:lvl1pPr>
           </a:lstStyle>
           <a:p>
@@ -1278,7 +1332,7 @@
         </p:nvSpPr>
         <p:spPr>
           <a:xfrm>
-            <a:off x="7617296" y="1484784"/>
+            <a:off x="7976492" y="1484784"/>
             <a:ext cx="1296988" cy="360362"/>
           </a:xfrm>
         </p:spPr>
@@ -1286,7 +1340,10 @@
           <a:bodyPr/>
           <a:lstStyle>
             <a:lvl1pPr>
-              <a:defRPr/>
+              <a:defRPr sz="1800" b="1">
+                <a:latin typeface="Arial" panose="020B0604020202020204" pitchFamily="34" charset="0"/>
+                <a:cs typeface="Arial" panose="020B0604020202020204" pitchFamily="34" charset="0"/>
+              </a:defRPr>
             </a:lvl1pPr>
           </a:lstStyle>
           <a:p>
@@ -1319,7 +1376,10 @@
           <a:bodyPr/>
           <a:lstStyle>
             <a:lvl1pPr>
-              <a:defRPr/>
+              <a:defRPr sz="1800">
+                <a:latin typeface="Arial" panose="020B0604020202020204" pitchFamily="34" charset="0"/>
+                <a:cs typeface="Arial" panose="020B0604020202020204" pitchFamily="34" charset="0"/>
+              </a:defRPr>
             </a:lvl1pPr>
           </a:lstStyle>
           <a:p>
@@ -1382,7 +1442,10 @@
           <a:bodyPr/>
           <a:lstStyle>
             <a:lvl1pPr algn="ctr">
-              <a:defRPr/>
+              <a:defRPr sz="1800" b="1">
+                <a:latin typeface="Arial" panose="020B0604020202020204" pitchFamily="34" charset="0"/>
+                <a:cs typeface="Arial" panose="020B0604020202020204" pitchFamily="34" charset="0"/>
+              </a:defRPr>
             </a:lvl1pPr>
           </a:lstStyle>
           <a:p>
@@ -1411,14 +1474,17 @@
         <p:spPr>
           <a:xfrm>
             <a:off x="1496616" y="1988840"/>
-            <a:ext cx="2880320" cy="2016224"/>
+            <a:ext cx="2736000" cy="1980000"/>
           </a:xfrm>
         </p:spPr>
         <p:txBody>
           <a:bodyPr/>
           <a:lstStyle>
             <a:lvl1pPr>
-              <a:defRPr/>
+              <a:defRPr sz="1800">
+                <a:latin typeface="Arial" panose="020B0604020202020204" pitchFamily="34" charset="0"/>
+                <a:cs typeface="Arial" panose="020B0604020202020204" pitchFamily="34" charset="0"/>
+              </a:defRPr>
             </a:lvl1pPr>
           </a:lstStyle>
           <a:p>
@@ -1443,14 +1509,17 @@
         <p:spPr>
           <a:xfrm>
             <a:off x="5673080" y="1988840"/>
-            <a:ext cx="2880320" cy="2016224"/>
+            <a:ext cx="2700000" cy="1980000"/>
           </a:xfrm>
         </p:spPr>
         <p:txBody>
           <a:bodyPr/>
           <a:lstStyle>
             <a:lvl1pPr>
-              <a:defRPr/>
+              <a:defRPr sz="1800">
+                <a:latin typeface="Arial" panose="020B0604020202020204" pitchFamily="34" charset="0"/>
+                <a:cs typeface="Arial" panose="020B0604020202020204" pitchFamily="34" charset="0"/>
+              </a:defRPr>
             </a:lvl1pPr>
           </a:lstStyle>
           <a:p>
@@ -1475,14 +1544,17 @@
         <p:spPr>
           <a:xfrm>
             <a:off x="3656856" y="4149080"/>
-            <a:ext cx="2880320" cy="2016224"/>
+            <a:ext cx="2700000" cy="1980000"/>
           </a:xfrm>
         </p:spPr>
         <p:txBody>
           <a:bodyPr/>
           <a:lstStyle>
             <a:lvl1pPr>
-              <a:defRPr/>
+              <a:defRPr sz="1800">
+                <a:latin typeface="Arial" panose="020B0604020202020204" pitchFamily="34" charset="0"/>
+                <a:cs typeface="Arial" panose="020B0604020202020204" pitchFamily="34" charset="0"/>
+              </a:defRPr>
             </a:lvl1pPr>
           </a:lstStyle>
           <a:p>
@@ -1506,7 +1578,7 @@
         </p:nvSpPr>
         <p:spPr>
           <a:xfrm>
-            <a:off x="2216696" y="1484784"/>
+            <a:off x="2575892" y="1484784"/>
             <a:ext cx="1296988" cy="360362"/>
           </a:xfrm>
         </p:spPr>
@@ -1514,7 +1586,10 @@
           <a:bodyPr/>
           <a:lstStyle>
             <a:lvl1pPr>
-              <a:defRPr/>
+              <a:defRPr sz="1800" b="1">
+                <a:latin typeface="Arial" panose="020B0604020202020204" pitchFamily="34" charset="0"/>
+                <a:cs typeface="Arial" panose="020B0604020202020204" pitchFamily="34" charset="0"/>
+              </a:defRPr>
             </a:lvl1pPr>
           </a:lstStyle>
           <a:p>
@@ -1539,7 +1614,7 @@
         </p:nvSpPr>
         <p:spPr>
           <a:xfrm>
-            <a:off x="6321152" y="1484784"/>
+            <a:off x="6680348" y="1484784"/>
             <a:ext cx="1296988" cy="360362"/>
           </a:xfrm>
         </p:spPr>
@@ -1547,7 +1622,10 @@
           <a:bodyPr/>
           <a:lstStyle>
             <a:lvl1pPr>
-              <a:defRPr/>
+              <a:defRPr sz="1800" b="1">
+                <a:latin typeface="Arial" panose="020B0604020202020204" pitchFamily="34" charset="0"/>
+                <a:cs typeface="Arial" panose="020B0604020202020204" pitchFamily="34" charset="0"/>
+              </a:defRPr>
             </a:lvl1pPr>
           </a:lstStyle>
           <a:p>
@@ -1580,7 +1658,10 @@
           <a:bodyPr/>
           <a:lstStyle>
             <a:lvl1pPr>
-              <a:defRPr/>
+              <a:defRPr sz="1800" b="1">
+                <a:latin typeface="Arial" panose="020B0604020202020204" pitchFamily="34" charset="0"/>
+                <a:cs typeface="Arial" panose="020B0604020202020204" pitchFamily="34" charset="0"/>
+              </a:defRPr>
             </a:lvl1pPr>
           </a:lstStyle>
           <a:p>
@@ -1676,7 +1757,10 @@
           <a:bodyPr/>
           <a:lstStyle>
             <a:lvl1pPr algn="ctr">
-              <a:defRPr/>
+              <a:defRPr sz="1800" b="1">
+                <a:latin typeface="Arial" panose="020B0604020202020204" pitchFamily="34" charset="0"/>
+                <a:cs typeface="Arial" panose="020B0604020202020204" pitchFamily="34" charset="0"/>
+              </a:defRPr>
             </a:lvl1pPr>
           </a:lstStyle>
           <a:p>
@@ -1704,15 +1788,18 @@
         </p:nvSpPr>
         <p:spPr>
           <a:xfrm>
-            <a:off x="344488" y="1988840"/>
-            <a:ext cx="2879849" cy="1800225"/>
+            <a:off x="344488" y="1988839"/>
+            <a:ext cx="2700000" cy="1980000"/>
           </a:xfrm>
         </p:spPr>
         <p:txBody>
           <a:bodyPr/>
           <a:lstStyle>
             <a:lvl1pPr>
-              <a:defRPr/>
+              <a:defRPr sz="1800">
+                <a:latin typeface="Arial" panose="020B0604020202020204" pitchFamily="34" charset="0"/>
+                <a:cs typeface="Arial" panose="020B0604020202020204" pitchFamily="34" charset="0"/>
+              </a:defRPr>
             </a:lvl1pPr>
           </a:lstStyle>
           <a:p>
@@ -1736,15 +1823,18 @@
         </p:nvSpPr>
         <p:spPr>
           <a:xfrm>
-            <a:off x="3512840" y="1988840"/>
-            <a:ext cx="2879849" cy="1800225"/>
+            <a:off x="3512840" y="1988839"/>
+            <a:ext cx="2700000" cy="1980000"/>
           </a:xfrm>
         </p:spPr>
         <p:txBody>
           <a:bodyPr/>
           <a:lstStyle>
             <a:lvl1pPr>
-              <a:defRPr/>
+              <a:defRPr sz="1800">
+                <a:latin typeface="Arial" panose="020B0604020202020204" pitchFamily="34" charset="0"/>
+                <a:cs typeface="Arial" panose="020B0604020202020204" pitchFamily="34" charset="0"/>
+              </a:defRPr>
             </a:lvl1pPr>
           </a:lstStyle>
           <a:p>
@@ -1768,15 +1858,18 @@
         </p:nvSpPr>
         <p:spPr>
           <a:xfrm>
-            <a:off x="6681192" y="1988840"/>
-            <a:ext cx="2879849" cy="1800225"/>
+            <a:off x="6681192" y="1988839"/>
+            <a:ext cx="2700000" cy="1980000"/>
           </a:xfrm>
         </p:spPr>
         <p:txBody>
           <a:bodyPr/>
           <a:lstStyle>
             <a:lvl1pPr>
-              <a:defRPr/>
+              <a:defRPr sz="1800">
+                <a:latin typeface="Arial" panose="020B0604020202020204" pitchFamily="34" charset="0"/>
+                <a:cs typeface="Arial" panose="020B0604020202020204" pitchFamily="34" charset="0"/>
+              </a:defRPr>
             </a:lvl1pPr>
           </a:lstStyle>
           <a:p>
@@ -1800,15 +1893,18 @@
         </p:nvSpPr>
         <p:spPr>
           <a:xfrm>
-            <a:off x="344488" y="4149080"/>
-            <a:ext cx="2879849" cy="1800225"/>
+            <a:off x="344488" y="4149079"/>
+            <a:ext cx="2700000" cy="1980000"/>
           </a:xfrm>
         </p:spPr>
         <p:txBody>
           <a:bodyPr/>
           <a:lstStyle>
             <a:lvl1pPr>
-              <a:defRPr/>
+              <a:defRPr sz="1800">
+                <a:latin typeface="Arial" panose="020B0604020202020204" pitchFamily="34" charset="0"/>
+                <a:cs typeface="Arial" panose="020B0604020202020204" pitchFamily="34" charset="0"/>
+              </a:defRPr>
             </a:lvl1pPr>
           </a:lstStyle>
           <a:p>
@@ -1832,15 +1928,18 @@
         </p:nvSpPr>
         <p:spPr>
           <a:xfrm>
-            <a:off x="3512840" y="4149080"/>
-            <a:ext cx="2879849" cy="1800225"/>
+            <a:off x="3512840" y="4149079"/>
+            <a:ext cx="2700000" cy="1980000"/>
           </a:xfrm>
         </p:spPr>
         <p:txBody>
           <a:bodyPr/>
           <a:lstStyle>
             <a:lvl1pPr>
-              <a:defRPr/>
+              <a:defRPr sz="1800">
+                <a:latin typeface="Arial" panose="020B0604020202020204" pitchFamily="34" charset="0"/>
+                <a:cs typeface="Arial" panose="020B0604020202020204" pitchFamily="34" charset="0"/>
+              </a:defRPr>
             </a:lvl1pPr>
           </a:lstStyle>
           <a:p>
@@ -1864,15 +1963,18 @@
         </p:nvSpPr>
         <p:spPr>
           <a:xfrm>
-            <a:off x="6681192" y="4149080"/>
-            <a:ext cx="2879849" cy="1800225"/>
+            <a:off x="6681192" y="4149079"/>
+            <a:ext cx="2700000" cy="1980000"/>
           </a:xfrm>
         </p:spPr>
         <p:txBody>
           <a:bodyPr/>
           <a:lstStyle>
             <a:lvl1pPr>
-              <a:defRPr/>
+              <a:defRPr sz="1800">
+                <a:latin typeface="Arial" panose="020B0604020202020204" pitchFamily="34" charset="0"/>
+                <a:cs typeface="Arial" panose="020B0604020202020204" pitchFamily="34" charset="0"/>
+              </a:defRPr>
             </a:lvl1pPr>
           </a:lstStyle>
           <a:p>
@@ -1896,7 +1998,7 @@
         </p:nvSpPr>
         <p:spPr>
           <a:xfrm>
-            <a:off x="1136576" y="1484784"/>
+            <a:off x="1495772" y="1484784"/>
             <a:ext cx="1296988" cy="360362"/>
           </a:xfrm>
         </p:spPr>
@@ -1904,7 +2006,10 @@
           <a:bodyPr/>
           <a:lstStyle>
             <a:lvl1pPr>
-              <a:defRPr/>
+              <a:defRPr sz="1800" b="1">
+                <a:latin typeface="Arial" panose="020B0604020202020204" pitchFamily="34" charset="0"/>
+                <a:cs typeface="Arial" panose="020B0604020202020204" pitchFamily="34" charset="0"/>
+              </a:defRPr>
             </a:lvl1pPr>
           </a:lstStyle>
           <a:p>
@@ -1929,7 +2034,7 @@
         </p:nvSpPr>
         <p:spPr>
           <a:xfrm>
-            <a:off x="4304928" y="1484784"/>
+            <a:off x="4664124" y="1484784"/>
             <a:ext cx="1296988" cy="360362"/>
           </a:xfrm>
         </p:spPr>
@@ -1937,7 +2042,10 @@
           <a:bodyPr/>
           <a:lstStyle>
             <a:lvl1pPr>
-              <a:defRPr/>
+              <a:defRPr sz="1800" b="1">
+                <a:latin typeface="Arial" panose="020B0604020202020204" pitchFamily="34" charset="0"/>
+                <a:cs typeface="Arial" panose="020B0604020202020204" pitchFamily="34" charset="0"/>
+              </a:defRPr>
             </a:lvl1pPr>
           </a:lstStyle>
           <a:p>
@@ -1962,7 +2070,7 @@
         </p:nvSpPr>
         <p:spPr>
           <a:xfrm>
-            <a:off x="7473280" y="1484784"/>
+            <a:off x="7832476" y="1484784"/>
             <a:ext cx="1296988" cy="360362"/>
           </a:xfrm>
         </p:spPr>
@@ -1970,7 +2078,10 @@
           <a:bodyPr/>
           <a:lstStyle>
             <a:lvl1pPr>
-              <a:defRPr/>
+              <a:defRPr sz="1800" b="1">
+                <a:latin typeface="Arial" panose="020B0604020202020204" pitchFamily="34" charset="0"/>
+                <a:cs typeface="Arial" panose="020B0604020202020204" pitchFamily="34" charset="0"/>
+              </a:defRPr>
             </a:lvl1pPr>
           </a:lstStyle>
           <a:p>
@@ -2066,7 +2177,10 @@
           <a:bodyPr/>
           <a:lstStyle>
             <a:lvl1pPr algn="ctr">
-              <a:defRPr sz="1800" baseline="0"/>
+              <a:defRPr sz="1800" b="1" baseline="0">
+                <a:latin typeface="Arial" panose="020B0604020202020204" pitchFamily="34" charset="0"/>
+                <a:cs typeface="Arial" panose="020B0604020202020204" pitchFamily="34" charset="0"/>
+              </a:defRPr>
             </a:lvl1pPr>
           </a:lstStyle>
           <a:p>
@@ -2098,15 +2212,18 @@
         </p:nvSpPr>
         <p:spPr>
           <a:xfrm>
-            <a:off x="1568624" y="1412776"/>
-            <a:ext cx="3672408" cy="1512168"/>
+            <a:off x="1641032" y="1340768"/>
+            <a:ext cx="3420000" cy="1584000"/>
           </a:xfrm>
         </p:spPr>
         <p:txBody>
           <a:bodyPr/>
           <a:lstStyle>
             <a:lvl1pPr>
-              <a:defRPr/>
+              <a:defRPr sz="1800">
+                <a:latin typeface="Arial" panose="020B0604020202020204" pitchFamily="34" charset="0"/>
+                <a:cs typeface="Arial" panose="020B0604020202020204" pitchFamily="34" charset="0"/>
+              </a:defRPr>
             </a:lvl1pPr>
           </a:lstStyle>
           <a:p>
@@ -2134,15 +2251,18 @@
         </p:nvSpPr>
         <p:spPr>
           <a:xfrm>
-            <a:off x="1568624" y="3068960"/>
-            <a:ext cx="3672408" cy="1512168"/>
+            <a:off x="1641032" y="2996952"/>
+            <a:ext cx="3420000" cy="1584000"/>
           </a:xfrm>
         </p:spPr>
         <p:txBody>
           <a:bodyPr/>
           <a:lstStyle>
             <a:lvl1pPr>
-              <a:defRPr baseline="0"/>
+              <a:defRPr sz="1800" baseline="0">
+                <a:latin typeface="Arial" panose="020B0604020202020204" pitchFamily="34" charset="0"/>
+                <a:cs typeface="Arial" panose="020B0604020202020204" pitchFamily="34" charset="0"/>
+              </a:defRPr>
             </a:lvl1pPr>
           </a:lstStyle>
           <a:p>
@@ -2170,15 +2290,18 @@
         </p:nvSpPr>
         <p:spPr>
           <a:xfrm>
-            <a:off x="1568624" y="4725144"/>
-            <a:ext cx="3672408" cy="1512168"/>
+            <a:off x="1641032" y="4653136"/>
+            <a:ext cx="3420000" cy="1584000"/>
           </a:xfrm>
         </p:spPr>
         <p:txBody>
           <a:bodyPr/>
           <a:lstStyle>
             <a:lvl1pPr>
-              <a:defRPr/>
+              <a:defRPr sz="1800">
+                <a:latin typeface="Arial" panose="020B0604020202020204" pitchFamily="34" charset="0"/>
+                <a:cs typeface="Arial" panose="020B0604020202020204" pitchFamily="34" charset="0"/>
+              </a:defRPr>
             </a:lvl1pPr>
           </a:lstStyle>
           <a:p>
@@ -2206,15 +2329,18 @@
         </p:nvSpPr>
         <p:spPr>
           <a:xfrm>
-            <a:off x="5457056" y="1412776"/>
-            <a:ext cx="3672408" cy="1512168"/>
+            <a:off x="5601472" y="1340768"/>
+            <a:ext cx="3420000" cy="1584000"/>
           </a:xfrm>
         </p:spPr>
         <p:txBody>
           <a:bodyPr/>
           <a:lstStyle>
             <a:lvl1pPr>
-              <a:defRPr/>
+              <a:defRPr sz="1800">
+                <a:latin typeface="Arial" panose="020B0604020202020204" pitchFamily="34" charset="0"/>
+                <a:cs typeface="Arial" panose="020B0604020202020204" pitchFamily="34" charset="0"/>
+              </a:defRPr>
             </a:lvl1pPr>
           </a:lstStyle>
           <a:p>
@@ -2242,15 +2368,18 @@
         </p:nvSpPr>
         <p:spPr>
           <a:xfrm>
-            <a:off x="5457056" y="3068960"/>
-            <a:ext cx="3672408" cy="1512168"/>
+            <a:off x="5601472" y="2996952"/>
+            <a:ext cx="3420000" cy="1584000"/>
           </a:xfrm>
         </p:spPr>
         <p:txBody>
           <a:bodyPr/>
           <a:lstStyle>
             <a:lvl1pPr>
-              <a:defRPr/>
+              <a:defRPr sz="1800">
+                <a:latin typeface="Arial" panose="020B0604020202020204" pitchFamily="34" charset="0"/>
+                <a:cs typeface="Arial" panose="020B0604020202020204" pitchFamily="34" charset="0"/>
+              </a:defRPr>
             </a:lvl1pPr>
           </a:lstStyle>
           <a:p>
@@ -2278,15 +2407,18 @@
         </p:nvSpPr>
         <p:spPr>
           <a:xfrm>
-            <a:off x="5457056" y="4725144"/>
-            <a:ext cx="3672408" cy="1512168"/>
+            <a:off x="5601472" y="4653136"/>
+            <a:ext cx="3420000" cy="1584000"/>
           </a:xfrm>
         </p:spPr>
         <p:txBody>
           <a:bodyPr/>
           <a:lstStyle>
             <a:lvl1pPr>
-              <a:defRPr baseline="0"/>
+              <a:defRPr sz="1800" baseline="0">
+                <a:latin typeface="Arial" panose="020B0604020202020204" pitchFamily="34" charset="0"/>
+                <a:cs typeface="Arial" panose="020B0604020202020204" pitchFamily="34" charset="0"/>
+              </a:defRPr>
             </a:lvl1pPr>
           </a:lstStyle>
           <a:p>
@@ -2314,7 +2446,7 @@
         </p:nvSpPr>
         <p:spPr>
           <a:xfrm>
-            <a:off x="128464" y="1988840"/>
+            <a:off x="199628" y="1988840"/>
             <a:ext cx="1296988" cy="360362"/>
           </a:xfrm>
         </p:spPr>
@@ -2322,7 +2454,10 @@
           <a:bodyPr/>
           <a:lstStyle>
             <a:lvl1pPr>
-              <a:defRPr baseline="0"/>
+              <a:defRPr sz="1800" b="1" baseline="0">
+                <a:latin typeface="Arial" panose="020B0604020202020204" pitchFamily="34" charset="0"/>
+                <a:cs typeface="Arial" panose="020B0604020202020204" pitchFamily="34" charset="0"/>
+              </a:defRPr>
             </a:lvl1pPr>
           </a:lstStyle>
           <a:p>
@@ -2351,7 +2486,7 @@
         </p:nvSpPr>
         <p:spPr>
           <a:xfrm>
-            <a:off x="128464" y="3573016"/>
+            <a:off x="199628" y="3573016"/>
             <a:ext cx="1296988" cy="360362"/>
           </a:xfrm>
         </p:spPr>
@@ -2359,7 +2494,10 @@
           <a:bodyPr/>
           <a:lstStyle>
             <a:lvl1pPr>
-              <a:defRPr baseline="0"/>
+              <a:defRPr sz="1800" b="1" baseline="0">
+                <a:latin typeface="Arial" panose="020B0604020202020204" pitchFamily="34" charset="0"/>
+                <a:cs typeface="Arial" panose="020B0604020202020204" pitchFamily="34" charset="0"/>
+              </a:defRPr>
             </a:lvl1pPr>
           </a:lstStyle>
           <a:p>
@@ -2388,7 +2526,7 @@
         </p:nvSpPr>
         <p:spPr>
           <a:xfrm>
-            <a:off x="128464" y="5301208"/>
+            <a:off x="199628" y="5301208"/>
             <a:ext cx="1296988" cy="360362"/>
           </a:xfrm>
         </p:spPr>
@@ -2396,7 +2534,10 @@
           <a:bodyPr/>
           <a:lstStyle>
             <a:lvl1pPr>
-              <a:defRPr/>
+              <a:defRPr sz="1800" b="1">
+                <a:latin typeface="Arial" panose="020B0604020202020204" pitchFamily="34" charset="0"/>
+                <a:cs typeface="Arial" panose="020B0604020202020204" pitchFamily="34" charset="0"/>
+              </a:defRPr>
             </a:lvl1pPr>
           </a:lstStyle>
           <a:p>
@@ -2904,12 +3045,12 @@
           <a:p>
             <a:pPr algn="ctr"/>
             <a:r>
-              <a:rPr lang="en-US" sz="4400">
+              <a:rPr lang="en-US" sz="4400" dirty="0">
                 <a:latin typeface="Arial"/>
               </a:rPr>
               <a:t>Click to edit the title text format</a:t>
             </a:r>
-            <a:endParaRPr/>
+            <a:endParaRPr dirty="0"/>
           </a:p>
         </p:txBody>
       </p:sp>
@@ -3956,16 +4097,7 @@
                 </a:solidFill>
                 <a:latin typeface="Arial"/>
               </a:rPr>
-              <a:t>AEROAKUSTIKA </a:t>
-            </a:r>
-            <a:r>
-              <a:rPr lang="cs-CZ" sz="2600" b="1" dirty="0" smtClean="0">
-                <a:solidFill>
-                  <a:srgbClr val="FFFFFF"/>
-                </a:solidFill>
-                <a:latin typeface="Arial"/>
-              </a:rPr>
-              <a:t>ZRCÁTKA</a:t>
+              <a:t>AEROAKUSTIKA ZRCÁTKA</a:t>
             </a:r>
             <a:endParaRPr lang="cs-CZ" sz="2600" b="1" dirty="0">
               <a:solidFill>
@@ -3992,16 +4124,7 @@
                 </a:solidFill>
                 <a:latin typeface="Arial"/>
               </a:rPr>
-              <a:t>ŠKODA </a:t>
-            </a:r>
-            <a:r>
-              <a:rPr lang="cs-CZ" sz="2600" b="1" dirty="0" smtClean="0">
-                <a:solidFill>
-                  <a:srgbClr val="FFFFFF"/>
-                </a:solidFill>
-                <a:latin typeface="Arial"/>
-              </a:rPr>
-              <a:t>RAPID SK370-3</a:t>
+              <a:t>ŠKODA RAPID SK370-3</a:t>
             </a:r>
             <a:endParaRPr lang="cs-CZ" sz="2600" b="1" dirty="0">
               <a:solidFill>
@@ -4261,42 +4384,13 @@
           <a:p>
             <a:r>
               <a:rPr lang="cs-CZ" b="1" dirty="0" smtClean="0"/>
-              <a:t>S100</a:t>
-            </a:r>
-            <a:r>
-              <a:rPr lang="cs-CZ" b="1" dirty="0" smtClean="0"/>
-              <a:t> </a:t>
-            </a:r>
-            <a:endParaRPr lang="cs-CZ" b="1" dirty="0" smtClean="0"/>
+              <a:t>S100 </a:t>
+            </a:r>
           </a:p>
           <a:p>
             <a:r>
               <a:rPr lang="cs-CZ" sz="1600" dirty="0" smtClean="0"/>
-              <a:t>- </a:t>
-            </a:r>
-            <a:r>
-              <a:rPr lang="cs-CZ" sz="1600" dirty="0" smtClean="0"/>
-              <a:t>výchozí</a:t>
-            </a:r>
-            <a:r>
-              <a:rPr lang="cs-CZ" sz="1600" dirty="0" smtClean="0"/>
-              <a:t> koncepce SK370-3 (</a:t>
-            </a:r>
-            <a:r>
-              <a:rPr lang="cs-CZ" sz="1600" dirty="0" smtClean="0"/>
-              <a:t>RAPID</a:t>
-            </a:r>
-            <a:r>
-              <a:rPr lang="cs-CZ" sz="1600" dirty="0" smtClean="0"/>
-              <a:t>) STRAK PR2 </a:t>
-            </a:r>
-            <a:r>
-              <a:rPr lang="cs-CZ" sz="1600" dirty="0" smtClean="0"/>
-              <a:t>se zrcátkem </a:t>
-            </a:r>
-            <a:r>
-              <a:rPr lang="cs-CZ" sz="1600" dirty="0" smtClean="0"/>
-              <a:t>PR2</a:t>
+              <a:t>- výchozí koncepce SK370-3 (RAPID) STRAK PR2 se zrcátkem PR2</a:t>
             </a:r>
             <a:endParaRPr lang="cs-CZ" sz="1600" dirty="0"/>
           </a:p>

</xml_diff>